<commit_message>
sp2 review and updates
</commit_message>
<xml_diff>
--- a/templates/template_sp2_presentation.pptx
+++ b/templates/template_sp2_presentation.pptx
@@ -208,7 +208,7 @@
           <a:p>
             <a:fld id="{72AF2863-FF39-C140-B82D-943C74D38424}" type="datetimeFigureOut">
               <a:rPr lang="en-GB" smtClean="0"/>
-              <a:t>16/08/2018</a:t>
+              <a:t>21/08/2018</a:t>
             </a:fld>
             <a:endParaRPr lang="en-GB"/>
           </a:p>
@@ -799,7 +799,7 @@
           <a:p>
             <a:fld id="{21DB4168-5CC6-5A4F-AB9F-11ABC7AF23EE}" type="datetimeFigureOut">
               <a:rPr lang="en-GB" smtClean="0"/>
-              <a:t>16/08/2018</a:t>
+              <a:t>21/08/2018</a:t>
             </a:fld>
             <a:endParaRPr lang="en-GB"/>
           </a:p>
@@ -999,7 +999,7 @@
           <a:p>
             <a:fld id="{21DB4168-5CC6-5A4F-AB9F-11ABC7AF23EE}" type="datetimeFigureOut">
               <a:rPr lang="en-GB" smtClean="0"/>
-              <a:t>16/08/2018</a:t>
+              <a:t>21/08/2018</a:t>
             </a:fld>
             <a:endParaRPr lang="en-GB"/>
           </a:p>
@@ -1209,7 +1209,7 @@
           <a:p>
             <a:fld id="{21DB4168-5CC6-5A4F-AB9F-11ABC7AF23EE}" type="datetimeFigureOut">
               <a:rPr lang="en-GB" smtClean="0"/>
-              <a:t>16/08/2018</a:t>
+              <a:t>21/08/2018</a:t>
             </a:fld>
             <a:endParaRPr lang="en-GB"/>
           </a:p>
@@ -1409,7 +1409,7 @@
           <a:p>
             <a:fld id="{21DB4168-5CC6-5A4F-AB9F-11ABC7AF23EE}" type="datetimeFigureOut">
               <a:rPr lang="en-GB" smtClean="0"/>
-              <a:t>16/08/2018</a:t>
+              <a:t>21/08/2018</a:t>
             </a:fld>
             <a:endParaRPr lang="en-GB"/>
           </a:p>
@@ -1685,7 +1685,7 @@
           <a:p>
             <a:fld id="{21DB4168-5CC6-5A4F-AB9F-11ABC7AF23EE}" type="datetimeFigureOut">
               <a:rPr lang="en-GB" smtClean="0"/>
-              <a:t>16/08/2018</a:t>
+              <a:t>21/08/2018</a:t>
             </a:fld>
             <a:endParaRPr lang="en-GB"/>
           </a:p>
@@ -1953,7 +1953,7 @@
           <a:p>
             <a:fld id="{21DB4168-5CC6-5A4F-AB9F-11ABC7AF23EE}" type="datetimeFigureOut">
               <a:rPr lang="en-GB" smtClean="0"/>
-              <a:t>16/08/2018</a:t>
+              <a:t>21/08/2018</a:t>
             </a:fld>
             <a:endParaRPr lang="en-GB"/>
           </a:p>
@@ -2368,7 +2368,7 @@
           <a:p>
             <a:fld id="{21DB4168-5CC6-5A4F-AB9F-11ABC7AF23EE}" type="datetimeFigureOut">
               <a:rPr lang="en-GB" smtClean="0"/>
-              <a:t>16/08/2018</a:t>
+              <a:t>21/08/2018</a:t>
             </a:fld>
             <a:endParaRPr lang="en-GB"/>
           </a:p>
@@ -2510,7 +2510,7 @@
           <a:p>
             <a:fld id="{21DB4168-5CC6-5A4F-AB9F-11ABC7AF23EE}" type="datetimeFigureOut">
               <a:rPr lang="en-GB" smtClean="0"/>
-              <a:t>16/08/2018</a:t>
+              <a:t>21/08/2018</a:t>
             </a:fld>
             <a:endParaRPr lang="en-GB"/>
           </a:p>
@@ -2623,7 +2623,7 @@
           <a:p>
             <a:fld id="{21DB4168-5CC6-5A4F-AB9F-11ABC7AF23EE}" type="datetimeFigureOut">
               <a:rPr lang="en-GB" smtClean="0"/>
-              <a:t>16/08/2018</a:t>
+              <a:t>21/08/2018</a:t>
             </a:fld>
             <a:endParaRPr lang="en-GB"/>
           </a:p>
@@ -2936,7 +2936,7 @@
           <a:p>
             <a:fld id="{21DB4168-5CC6-5A4F-AB9F-11ABC7AF23EE}" type="datetimeFigureOut">
               <a:rPr lang="en-GB" smtClean="0"/>
-              <a:t>16/08/2018</a:t>
+              <a:t>21/08/2018</a:t>
             </a:fld>
             <a:endParaRPr lang="en-GB"/>
           </a:p>
@@ -3225,7 +3225,7 @@
           <a:p>
             <a:fld id="{21DB4168-5CC6-5A4F-AB9F-11ABC7AF23EE}" type="datetimeFigureOut">
               <a:rPr lang="en-GB" smtClean="0"/>
-              <a:t>16/08/2018</a:t>
+              <a:t>21/08/2018</a:t>
             </a:fld>
             <a:endParaRPr lang="en-GB"/>
           </a:p>
@@ -3468,7 +3468,7 @@
           <a:p>
             <a:fld id="{21DB4168-5CC6-5A4F-AB9F-11ABC7AF23EE}" type="datetimeFigureOut">
               <a:rPr lang="en-GB" smtClean="0"/>
-              <a:t>16/08/2018</a:t>
+              <a:t>21/08/2018</a:t>
             </a:fld>
             <a:endParaRPr lang="en-GB"/>
           </a:p>
@@ -4052,7 +4052,7 @@
             </a:r>
             <a:r>
               <a:rPr lang="en-GB" sz="6400" dirty="0"/>
-              <a:t> – Review of the IA report (this might not be finished yet).</a:t>
+              <a:t> – Review of the your card sort and tree jack exercises</a:t>
             </a:r>
           </a:p>
           <a:p>

</xml_diff>

<commit_message>
updates following revision of sp2
marksheet and slides updated for ideation, user research and proposal.
</commit_message>
<xml_diff>
--- a/templates/template_sp2_presentation.pptx
+++ b/templates/template_sp2_presentation.pptx
@@ -5,21 +5,22 @@
     <p:sldMasterId id="2147483648" r:id="rId1"/>
   </p:sldMasterIdLst>
   <p:notesMasterIdLst>
-    <p:notesMasterId r:id="rId14"/>
+    <p:notesMasterId r:id="rId15"/>
   </p:notesMasterIdLst>
   <p:sldIdLst>
     <p:sldId id="257" r:id="rId2"/>
     <p:sldId id="256" r:id="rId3"/>
     <p:sldId id="258" r:id="rId4"/>
-    <p:sldId id="259" r:id="rId5"/>
-    <p:sldId id="260" r:id="rId6"/>
-    <p:sldId id="261" r:id="rId7"/>
-    <p:sldId id="262" r:id="rId8"/>
-    <p:sldId id="263" r:id="rId9"/>
-    <p:sldId id="264" r:id="rId10"/>
-    <p:sldId id="265" r:id="rId11"/>
-    <p:sldId id="266" r:id="rId12"/>
-    <p:sldId id="267" r:id="rId13"/>
+    <p:sldId id="268" r:id="rId5"/>
+    <p:sldId id="269" r:id="rId6"/>
+    <p:sldId id="259" r:id="rId7"/>
+    <p:sldId id="260" r:id="rId8"/>
+    <p:sldId id="261" r:id="rId9"/>
+    <p:sldId id="262" r:id="rId10"/>
+    <p:sldId id="263" r:id="rId11"/>
+    <p:sldId id="264" r:id="rId12"/>
+    <p:sldId id="265" r:id="rId13"/>
+    <p:sldId id="266" r:id="rId14"/>
   </p:sldIdLst>
   <p:sldSz cx="12192000" cy="6858000"/>
   <p:notesSz cx="6858000" cy="9144000"/>
@@ -208,7 +209,7 @@
           <a:p>
             <a:fld id="{72AF2863-FF39-C140-B82D-943C74D38424}" type="datetimeFigureOut">
               <a:rPr lang="en-GB" smtClean="0"/>
-              <a:t>21/08/2018</a:t>
+              <a:t>31/08/2018</a:t>
             </a:fld>
             <a:endParaRPr lang="en-GB"/>
           </a:p>
@@ -799,7 +800,7 @@
           <a:p>
             <a:fld id="{21DB4168-5CC6-5A4F-AB9F-11ABC7AF23EE}" type="datetimeFigureOut">
               <a:rPr lang="en-GB" smtClean="0"/>
-              <a:t>21/08/2018</a:t>
+              <a:t>31/08/2018</a:t>
             </a:fld>
             <a:endParaRPr lang="en-GB"/>
           </a:p>
@@ -999,7 +1000,7 @@
           <a:p>
             <a:fld id="{21DB4168-5CC6-5A4F-AB9F-11ABC7AF23EE}" type="datetimeFigureOut">
               <a:rPr lang="en-GB" smtClean="0"/>
-              <a:t>21/08/2018</a:t>
+              <a:t>31/08/2018</a:t>
             </a:fld>
             <a:endParaRPr lang="en-GB"/>
           </a:p>
@@ -1209,7 +1210,7 @@
           <a:p>
             <a:fld id="{21DB4168-5CC6-5A4F-AB9F-11ABC7AF23EE}" type="datetimeFigureOut">
               <a:rPr lang="en-GB" smtClean="0"/>
-              <a:t>21/08/2018</a:t>
+              <a:t>31/08/2018</a:t>
             </a:fld>
             <a:endParaRPr lang="en-GB"/>
           </a:p>
@@ -1409,7 +1410,7 @@
           <a:p>
             <a:fld id="{21DB4168-5CC6-5A4F-AB9F-11ABC7AF23EE}" type="datetimeFigureOut">
               <a:rPr lang="en-GB" smtClean="0"/>
-              <a:t>21/08/2018</a:t>
+              <a:t>31/08/2018</a:t>
             </a:fld>
             <a:endParaRPr lang="en-GB"/>
           </a:p>
@@ -1685,7 +1686,7 @@
           <a:p>
             <a:fld id="{21DB4168-5CC6-5A4F-AB9F-11ABC7AF23EE}" type="datetimeFigureOut">
               <a:rPr lang="en-GB" smtClean="0"/>
-              <a:t>21/08/2018</a:t>
+              <a:t>31/08/2018</a:t>
             </a:fld>
             <a:endParaRPr lang="en-GB"/>
           </a:p>
@@ -1953,7 +1954,7 @@
           <a:p>
             <a:fld id="{21DB4168-5CC6-5A4F-AB9F-11ABC7AF23EE}" type="datetimeFigureOut">
               <a:rPr lang="en-GB" smtClean="0"/>
-              <a:t>21/08/2018</a:t>
+              <a:t>31/08/2018</a:t>
             </a:fld>
             <a:endParaRPr lang="en-GB"/>
           </a:p>
@@ -2368,7 +2369,7 @@
           <a:p>
             <a:fld id="{21DB4168-5CC6-5A4F-AB9F-11ABC7AF23EE}" type="datetimeFigureOut">
               <a:rPr lang="en-GB" smtClean="0"/>
-              <a:t>21/08/2018</a:t>
+              <a:t>31/08/2018</a:t>
             </a:fld>
             <a:endParaRPr lang="en-GB"/>
           </a:p>
@@ -2510,7 +2511,7 @@
           <a:p>
             <a:fld id="{21DB4168-5CC6-5A4F-AB9F-11ABC7AF23EE}" type="datetimeFigureOut">
               <a:rPr lang="en-GB" smtClean="0"/>
-              <a:t>21/08/2018</a:t>
+              <a:t>31/08/2018</a:t>
             </a:fld>
             <a:endParaRPr lang="en-GB"/>
           </a:p>
@@ -2623,7 +2624,7 @@
           <a:p>
             <a:fld id="{21DB4168-5CC6-5A4F-AB9F-11ABC7AF23EE}" type="datetimeFigureOut">
               <a:rPr lang="en-GB" smtClean="0"/>
-              <a:t>21/08/2018</a:t>
+              <a:t>31/08/2018</a:t>
             </a:fld>
             <a:endParaRPr lang="en-GB"/>
           </a:p>
@@ -2936,7 +2937,7 @@
           <a:p>
             <a:fld id="{21DB4168-5CC6-5A4F-AB9F-11ABC7AF23EE}" type="datetimeFigureOut">
               <a:rPr lang="en-GB" smtClean="0"/>
-              <a:t>21/08/2018</a:t>
+              <a:t>31/08/2018</a:t>
             </a:fld>
             <a:endParaRPr lang="en-GB"/>
           </a:p>
@@ -3225,7 +3226,7 @@
           <a:p>
             <a:fld id="{21DB4168-5CC6-5A4F-AB9F-11ABC7AF23EE}" type="datetimeFigureOut">
               <a:rPr lang="en-GB" smtClean="0"/>
-              <a:t>21/08/2018</a:t>
+              <a:t>31/08/2018</a:t>
             </a:fld>
             <a:endParaRPr lang="en-GB"/>
           </a:p>
@@ -3468,7 +3469,7 @@
           <a:p>
             <a:fld id="{21DB4168-5CC6-5A4F-AB9F-11ABC7AF23EE}" type="datetimeFigureOut">
               <a:rPr lang="en-GB" smtClean="0"/>
-              <a:t>21/08/2018</a:t>
+              <a:t>31/08/2018</a:t>
             </a:fld>
             <a:endParaRPr lang="en-GB"/>
           </a:p>
@@ -3988,7 +3989,7 @@
             </a:r>
             <a:r>
               <a:rPr lang="en-GB" sz="6400" dirty="0"/>
-              <a:t> – Short (bulleted) introduction to the proposed guide.</a:t>
+              <a:t> – Short review of ideation process</a:t>
             </a:r>
           </a:p>
           <a:p>
@@ -4004,7 +4005,7 @@
             </a:r>
             <a:r>
               <a:rPr lang="en-GB" sz="6400" dirty="0"/>
-              <a:t> – Review of competitor analysis</a:t>
+              <a:t> – Short summary of user research</a:t>
             </a:r>
           </a:p>
           <a:p>
@@ -4016,11 +4017,11 @@
             </a:pPr>
             <a:r>
               <a:rPr lang="en-GB" sz="6400" b="1" dirty="0"/>
-              <a:t>Slides 4, 5, &amp; 6</a:t>
+              <a:t>Slide 4</a:t>
             </a:r>
             <a:r>
               <a:rPr lang="en-GB" sz="6400" dirty="0"/>
-              <a:t> – Your personas</a:t>
+              <a:t> – Short (bulleted) introduction to the proposed guide (based on The Proposal).</a:t>
             </a:r>
           </a:p>
           <a:p>
@@ -4032,11 +4033,11 @@
             </a:pPr>
             <a:r>
               <a:rPr lang="en-GB" sz="6400" b="1" dirty="0"/>
-              <a:t>Slide 7 </a:t>
+              <a:t>Slide 5</a:t>
             </a:r>
             <a:r>
               <a:rPr lang="en-GB" sz="6400" dirty="0"/>
-              <a:t>– Sample of one of your user journeys</a:t>
+              <a:t> – Review of competitor analysis</a:t>
             </a:r>
           </a:p>
           <a:p>
@@ -4048,11 +4049,11 @@
             </a:pPr>
             <a:r>
               <a:rPr lang="en-GB" sz="6400" b="1" dirty="0"/>
-              <a:t>Slide 8</a:t>
+              <a:t>Slides 6, 7, &amp; 8</a:t>
             </a:r>
             <a:r>
               <a:rPr lang="en-GB" sz="6400" dirty="0"/>
-              <a:t> – Review of the your card sort and tree jack exercises</a:t>
+              <a:t> – Your personas</a:t>
             </a:r>
           </a:p>
           <a:p>
@@ -4064,11 +4065,11 @@
             </a:pPr>
             <a:r>
               <a:rPr lang="en-GB" sz="6400" b="1" dirty="0"/>
-              <a:t>Slide 9</a:t>
+              <a:t>Slide 9 </a:t>
             </a:r>
             <a:r>
               <a:rPr lang="en-GB" sz="6400" dirty="0"/>
-              <a:t> – Site plan illustration</a:t>
+              <a:t>– Sample of one of your user journeys</a:t>
             </a:r>
           </a:p>
           <a:p>
@@ -4084,7 +4085,23 @@
             </a:r>
             <a:r>
               <a:rPr lang="en-GB" sz="6400" dirty="0"/>
-              <a:t> – Conclusion</a:t>
+              <a:t> – Review of the your card sort and tree jack exercises</a:t>
+            </a:r>
+          </a:p>
+          <a:p>
+            <a:pPr marL="0" indent="0">
+              <a:lnSpc>
+                <a:spcPct val="120000"/>
+              </a:lnSpc>
+              <a:buNone/>
+            </a:pPr>
+            <a:r>
+              <a:rPr lang="en-GB" sz="6400" b="1" dirty="0"/>
+              <a:t>Slide 11</a:t>
+            </a:r>
+            <a:r>
+              <a:rPr lang="en-GB" sz="6400" dirty="0"/>
+              <a:t> – Site plan illustration</a:t>
             </a:r>
           </a:p>
           <a:p>
@@ -4130,7 +4147,7 @@
           <p:cNvPr id="2" name="Title 1">
             <a:extLst>
               <a:ext uri="{FF2B5EF4-FFF2-40B4-BE49-F238E27FC236}">
-                <a16:creationId xmlns:a16="http://schemas.microsoft.com/office/drawing/2014/main" id="{B1BF676F-68BA-ED4E-8D95-41A7430AFE97}"/>
+                <a16:creationId xmlns:a16="http://schemas.microsoft.com/office/drawing/2014/main" id="{AB81AE2D-6B8D-E74C-B252-A1BF358D0BE0}"/>
               </a:ext>
             </a:extLst>
           </p:cNvPr>
@@ -4148,7 +4165,7 @@
           <a:p>
             <a:r>
               <a:rPr lang="en-GB" dirty="0"/>
-              <a:t>Information Architecture - review</a:t>
+              <a:t>Persona three</a:t>
             </a:r>
           </a:p>
         </p:txBody>
@@ -4158,7 +4175,7 @@
           <p:cNvPr id="3" name="Content Placeholder 2">
             <a:extLst>
               <a:ext uri="{FF2B5EF4-FFF2-40B4-BE49-F238E27FC236}">
-                <a16:creationId xmlns:a16="http://schemas.microsoft.com/office/drawing/2014/main" id="{4D115918-10CC-2648-9C35-29E8810F5091}"/>
+                <a16:creationId xmlns:a16="http://schemas.microsoft.com/office/drawing/2014/main" id="{11F9F2A6-3949-2C4E-BCF6-8CA1180722A5}"/>
               </a:ext>
             </a:extLst>
           </p:cNvPr>
@@ -4181,7 +4198,7 @@
     </p:spTree>
     <p:extLst>
       <p:ext uri="{BB962C8B-B14F-4D97-AF65-F5344CB8AC3E}">
-        <p14:creationId xmlns:p14="http://schemas.microsoft.com/office/powerpoint/2010/main" val="1031938049"/>
+        <p14:creationId xmlns:p14="http://schemas.microsoft.com/office/powerpoint/2010/main" val="2641795805"/>
       </p:ext>
     </p:extLst>
   </p:cSld>
@@ -4213,7 +4230,7 @@
           <p:cNvPr id="2" name="Title 1">
             <a:extLst>
               <a:ext uri="{FF2B5EF4-FFF2-40B4-BE49-F238E27FC236}">
-                <a16:creationId xmlns:a16="http://schemas.microsoft.com/office/drawing/2014/main" id="{4CEC8F26-3333-0A42-A353-114B2D12526D}"/>
+                <a16:creationId xmlns:a16="http://schemas.microsoft.com/office/drawing/2014/main" id="{CFC7A555-8EC5-5145-9973-8F1D1541E78E}"/>
               </a:ext>
             </a:extLst>
           </p:cNvPr>
@@ -4231,7 +4248,7 @@
           <a:p>
             <a:r>
               <a:rPr lang="en-GB" dirty="0"/>
-              <a:t>Site plan</a:t>
+              <a:t>Sample user journey</a:t>
             </a:r>
           </a:p>
         </p:txBody>
@@ -4241,7 +4258,7 @@
           <p:cNvPr id="3" name="Content Placeholder 2">
             <a:extLst>
               <a:ext uri="{FF2B5EF4-FFF2-40B4-BE49-F238E27FC236}">
-                <a16:creationId xmlns:a16="http://schemas.microsoft.com/office/drawing/2014/main" id="{2E7E34D9-BAF6-0742-8E9E-790961049630}"/>
+                <a16:creationId xmlns:a16="http://schemas.microsoft.com/office/drawing/2014/main" id="{573EECF9-A196-7547-8E8B-3C159E9C7D55}"/>
               </a:ext>
             </a:extLst>
           </p:cNvPr>
@@ -4264,7 +4281,7 @@
     </p:spTree>
     <p:extLst>
       <p:ext uri="{BB962C8B-B14F-4D97-AF65-F5344CB8AC3E}">
-        <p14:creationId xmlns:p14="http://schemas.microsoft.com/office/powerpoint/2010/main" val="4117756738"/>
+        <p14:creationId xmlns:p14="http://schemas.microsoft.com/office/powerpoint/2010/main" val="1901079578"/>
       </p:ext>
     </p:extLst>
   </p:cSld>
@@ -4296,7 +4313,7 @@
           <p:cNvPr id="2" name="Title 1">
             <a:extLst>
               <a:ext uri="{FF2B5EF4-FFF2-40B4-BE49-F238E27FC236}">
-                <a16:creationId xmlns:a16="http://schemas.microsoft.com/office/drawing/2014/main" id="{A036AA5B-F329-4445-A00D-47EC9BF79449}"/>
+                <a16:creationId xmlns:a16="http://schemas.microsoft.com/office/drawing/2014/main" id="{B1BF676F-68BA-ED4E-8D95-41A7430AFE97}"/>
               </a:ext>
             </a:extLst>
           </p:cNvPr>
@@ -4314,7 +4331,7 @@
           <a:p>
             <a:r>
               <a:rPr lang="en-GB" dirty="0"/>
-              <a:t>Conclusion</a:t>
+              <a:t>Information Architecture - review</a:t>
             </a:r>
           </a:p>
         </p:txBody>
@@ -4324,7 +4341,7 @@
           <p:cNvPr id="3" name="Content Placeholder 2">
             <a:extLst>
               <a:ext uri="{FF2B5EF4-FFF2-40B4-BE49-F238E27FC236}">
-                <a16:creationId xmlns:a16="http://schemas.microsoft.com/office/drawing/2014/main" id="{380AE337-3A98-6C45-9B45-F7900BF3589D}"/>
+                <a16:creationId xmlns:a16="http://schemas.microsoft.com/office/drawing/2014/main" id="{4D115918-10CC-2648-9C35-29E8810F5091}"/>
               </a:ext>
             </a:extLst>
           </p:cNvPr>
@@ -4347,7 +4364,90 @@
     </p:spTree>
     <p:extLst>
       <p:ext uri="{BB962C8B-B14F-4D97-AF65-F5344CB8AC3E}">
-        <p14:creationId xmlns:p14="http://schemas.microsoft.com/office/powerpoint/2010/main" val="1429566949"/>
+        <p14:creationId xmlns:p14="http://schemas.microsoft.com/office/powerpoint/2010/main" val="1031938049"/>
+      </p:ext>
+    </p:extLst>
+  </p:cSld>
+  <p:clrMapOvr>
+    <a:masterClrMapping/>
+  </p:clrMapOvr>
+</p:sld>
+</file>
+
+<file path=ppt/slides/slide13.xml><?xml version="1.0" encoding="utf-8"?>
+<p:sld xmlns:a="http://schemas.openxmlformats.org/drawingml/2006/main" xmlns:r="http://schemas.openxmlformats.org/officeDocument/2006/relationships" xmlns:p="http://schemas.openxmlformats.org/presentationml/2006/main">
+  <p:cSld>
+    <p:spTree>
+      <p:nvGrpSpPr>
+        <p:cNvPr id="1" name=""/>
+        <p:cNvGrpSpPr/>
+        <p:nvPr/>
+      </p:nvGrpSpPr>
+      <p:grpSpPr>
+        <a:xfrm>
+          <a:off x="0" y="0"/>
+          <a:ext cx="0" cy="0"/>
+          <a:chOff x="0" y="0"/>
+          <a:chExt cx="0" cy="0"/>
+        </a:xfrm>
+      </p:grpSpPr>
+      <p:sp>
+        <p:nvSpPr>
+          <p:cNvPr id="2" name="Title 1">
+            <a:extLst>
+              <a:ext uri="{FF2B5EF4-FFF2-40B4-BE49-F238E27FC236}">
+                <a16:creationId xmlns:a16="http://schemas.microsoft.com/office/drawing/2014/main" id="{4CEC8F26-3333-0A42-A353-114B2D12526D}"/>
+              </a:ext>
+            </a:extLst>
+          </p:cNvPr>
+          <p:cNvSpPr>
+            <a:spLocks noGrp="1"/>
+          </p:cNvSpPr>
+          <p:nvPr>
+            <p:ph type="title"/>
+          </p:nvPr>
+        </p:nvSpPr>
+        <p:spPr/>
+        <p:txBody>
+          <a:bodyPr/>
+          <a:lstStyle/>
+          <a:p>
+            <a:r>
+              <a:rPr lang="en-GB" dirty="0"/>
+              <a:t>Site plan</a:t>
+            </a:r>
+          </a:p>
+        </p:txBody>
+      </p:sp>
+      <p:sp>
+        <p:nvSpPr>
+          <p:cNvPr id="3" name="Content Placeholder 2">
+            <a:extLst>
+              <a:ext uri="{FF2B5EF4-FFF2-40B4-BE49-F238E27FC236}">
+                <a16:creationId xmlns:a16="http://schemas.microsoft.com/office/drawing/2014/main" id="{2E7E34D9-BAF6-0742-8E9E-790961049630}"/>
+              </a:ext>
+            </a:extLst>
+          </p:cNvPr>
+          <p:cNvSpPr>
+            <a:spLocks noGrp="1"/>
+          </p:cNvSpPr>
+          <p:nvPr>
+            <p:ph idx="1"/>
+          </p:nvPr>
+        </p:nvSpPr>
+        <p:spPr/>
+        <p:txBody>
+          <a:bodyPr/>
+          <a:lstStyle/>
+          <a:p>
+            <a:endParaRPr lang="en-GB"/>
+          </a:p>
+        </p:txBody>
+      </p:sp>
+    </p:spTree>
+    <p:extLst>
+      <p:ext uri="{BB962C8B-B14F-4D97-AF65-F5344CB8AC3E}">
+        <p14:creationId xmlns:p14="http://schemas.microsoft.com/office/powerpoint/2010/main" val="4117756738"/>
       </p:ext>
     </p:extLst>
   </p:cSld>
@@ -4549,7 +4649,7 @@
           <p:cNvPr id="2" name="Title 1">
             <a:extLst>
               <a:ext uri="{FF2B5EF4-FFF2-40B4-BE49-F238E27FC236}">
-                <a16:creationId xmlns:a16="http://schemas.microsoft.com/office/drawing/2014/main" id="{07AB9AF7-061B-B548-BF6D-FD04C1F8B77F}"/>
+                <a16:creationId xmlns:a16="http://schemas.microsoft.com/office/drawing/2014/main" id="{C5B652AB-BDDE-554E-A2A0-0F2A7C98219B}"/>
               </a:ext>
             </a:extLst>
           </p:cNvPr>
@@ -4567,7 +4667,7 @@
           <a:p>
             <a:r>
               <a:rPr lang="en-GB" dirty="0"/>
-              <a:t>Your guide</a:t>
+              <a:t>Ideation</a:t>
             </a:r>
           </a:p>
         </p:txBody>
@@ -4577,7 +4677,7 @@
           <p:cNvPr id="3" name="Content Placeholder 2">
             <a:extLst>
               <a:ext uri="{FF2B5EF4-FFF2-40B4-BE49-F238E27FC236}">
-                <a16:creationId xmlns:a16="http://schemas.microsoft.com/office/drawing/2014/main" id="{1B36835E-A556-A443-A070-3C13F9DC9E37}"/>
+                <a16:creationId xmlns:a16="http://schemas.microsoft.com/office/drawing/2014/main" id="{5713B3DF-B404-454E-B6A5-E86844A2AD55}"/>
               </a:ext>
             </a:extLst>
           </p:cNvPr>
@@ -4600,7 +4700,7 @@
     </p:spTree>
     <p:extLst>
       <p:ext uri="{BB962C8B-B14F-4D97-AF65-F5344CB8AC3E}">
-        <p14:creationId xmlns:p14="http://schemas.microsoft.com/office/powerpoint/2010/main" val="3689223035"/>
+        <p14:creationId xmlns:p14="http://schemas.microsoft.com/office/powerpoint/2010/main" val="3870359793"/>
       </p:ext>
     </p:extLst>
   </p:cSld>
@@ -4632,7 +4732,7 @@
           <p:cNvPr id="2" name="Title 1">
             <a:extLst>
               <a:ext uri="{FF2B5EF4-FFF2-40B4-BE49-F238E27FC236}">
-                <a16:creationId xmlns:a16="http://schemas.microsoft.com/office/drawing/2014/main" id="{69C63175-69C4-0945-8C74-07BB12C6A37D}"/>
+                <a16:creationId xmlns:a16="http://schemas.microsoft.com/office/drawing/2014/main" id="{E9F7330D-3E59-D441-B261-A76DA956E8B7}"/>
               </a:ext>
             </a:extLst>
           </p:cNvPr>
@@ -4650,7 +4750,7 @@
           <a:p>
             <a:r>
               <a:rPr lang="en-GB" dirty="0"/>
-              <a:t>Competitor analysis</a:t>
+              <a:t>User research</a:t>
             </a:r>
           </a:p>
         </p:txBody>
@@ -4660,7 +4760,7 @@
           <p:cNvPr id="3" name="Content Placeholder 2">
             <a:extLst>
               <a:ext uri="{FF2B5EF4-FFF2-40B4-BE49-F238E27FC236}">
-                <a16:creationId xmlns:a16="http://schemas.microsoft.com/office/drawing/2014/main" id="{CFCA5262-8FEA-2042-9D46-E1A73571D573}"/>
+                <a16:creationId xmlns:a16="http://schemas.microsoft.com/office/drawing/2014/main" id="{2D38CD62-B684-5846-B421-C3BCFF173192}"/>
               </a:ext>
             </a:extLst>
           </p:cNvPr>
@@ -4683,7 +4783,7 @@
     </p:spTree>
     <p:extLst>
       <p:ext uri="{BB962C8B-B14F-4D97-AF65-F5344CB8AC3E}">
-        <p14:creationId xmlns:p14="http://schemas.microsoft.com/office/powerpoint/2010/main" val="4213051130"/>
+        <p14:creationId xmlns:p14="http://schemas.microsoft.com/office/powerpoint/2010/main" val="2331390779"/>
       </p:ext>
     </p:extLst>
   </p:cSld>
@@ -4715,7 +4815,7 @@
           <p:cNvPr id="2" name="Title 1">
             <a:extLst>
               <a:ext uri="{FF2B5EF4-FFF2-40B4-BE49-F238E27FC236}">
-                <a16:creationId xmlns:a16="http://schemas.microsoft.com/office/drawing/2014/main" id="{AB81AE2D-6B8D-E74C-B252-A1BF358D0BE0}"/>
+                <a16:creationId xmlns:a16="http://schemas.microsoft.com/office/drawing/2014/main" id="{07AB9AF7-061B-B548-BF6D-FD04C1F8B77F}"/>
               </a:ext>
             </a:extLst>
           </p:cNvPr>
@@ -4733,7 +4833,7 @@
           <a:p>
             <a:r>
               <a:rPr lang="en-GB" dirty="0"/>
-              <a:t>Persona one</a:t>
+              <a:t>Your guide</a:t>
             </a:r>
           </a:p>
         </p:txBody>
@@ -4743,7 +4843,7 @@
           <p:cNvPr id="3" name="Content Placeholder 2">
             <a:extLst>
               <a:ext uri="{FF2B5EF4-FFF2-40B4-BE49-F238E27FC236}">
-                <a16:creationId xmlns:a16="http://schemas.microsoft.com/office/drawing/2014/main" id="{11F9F2A6-3949-2C4E-BCF6-8CA1180722A5}"/>
+                <a16:creationId xmlns:a16="http://schemas.microsoft.com/office/drawing/2014/main" id="{1B36835E-A556-A443-A070-3C13F9DC9E37}"/>
               </a:ext>
             </a:extLst>
           </p:cNvPr>
@@ -4766,7 +4866,7 @@
     </p:spTree>
     <p:extLst>
       <p:ext uri="{BB962C8B-B14F-4D97-AF65-F5344CB8AC3E}">
-        <p14:creationId xmlns:p14="http://schemas.microsoft.com/office/powerpoint/2010/main" val="565579191"/>
+        <p14:creationId xmlns:p14="http://schemas.microsoft.com/office/powerpoint/2010/main" val="3689223035"/>
       </p:ext>
     </p:extLst>
   </p:cSld>
@@ -4798,7 +4898,7 @@
           <p:cNvPr id="2" name="Title 1">
             <a:extLst>
               <a:ext uri="{FF2B5EF4-FFF2-40B4-BE49-F238E27FC236}">
-                <a16:creationId xmlns:a16="http://schemas.microsoft.com/office/drawing/2014/main" id="{AB81AE2D-6B8D-E74C-B252-A1BF358D0BE0}"/>
+                <a16:creationId xmlns:a16="http://schemas.microsoft.com/office/drawing/2014/main" id="{69C63175-69C4-0945-8C74-07BB12C6A37D}"/>
               </a:ext>
             </a:extLst>
           </p:cNvPr>
@@ -4816,7 +4916,7 @@
           <a:p>
             <a:r>
               <a:rPr lang="en-GB" dirty="0"/>
-              <a:t>Persona two</a:t>
+              <a:t>Competitor analysis</a:t>
             </a:r>
           </a:p>
         </p:txBody>
@@ -4826,7 +4926,7 @@
           <p:cNvPr id="3" name="Content Placeholder 2">
             <a:extLst>
               <a:ext uri="{FF2B5EF4-FFF2-40B4-BE49-F238E27FC236}">
-                <a16:creationId xmlns:a16="http://schemas.microsoft.com/office/drawing/2014/main" id="{11F9F2A6-3949-2C4E-BCF6-8CA1180722A5}"/>
+                <a16:creationId xmlns:a16="http://schemas.microsoft.com/office/drawing/2014/main" id="{CFCA5262-8FEA-2042-9D46-E1A73571D573}"/>
               </a:ext>
             </a:extLst>
           </p:cNvPr>
@@ -4849,7 +4949,7 @@
     </p:spTree>
     <p:extLst>
       <p:ext uri="{BB962C8B-B14F-4D97-AF65-F5344CB8AC3E}">
-        <p14:creationId xmlns:p14="http://schemas.microsoft.com/office/powerpoint/2010/main" val="3460019064"/>
+        <p14:creationId xmlns:p14="http://schemas.microsoft.com/office/powerpoint/2010/main" val="4213051130"/>
       </p:ext>
     </p:extLst>
   </p:cSld>
@@ -4899,7 +4999,7 @@
           <a:p>
             <a:r>
               <a:rPr lang="en-GB" dirty="0"/>
-              <a:t>Persona three</a:t>
+              <a:t>Persona one</a:t>
             </a:r>
           </a:p>
         </p:txBody>
@@ -4932,7 +5032,7 @@
     </p:spTree>
     <p:extLst>
       <p:ext uri="{BB962C8B-B14F-4D97-AF65-F5344CB8AC3E}">
-        <p14:creationId xmlns:p14="http://schemas.microsoft.com/office/powerpoint/2010/main" val="2641795805"/>
+        <p14:creationId xmlns:p14="http://schemas.microsoft.com/office/powerpoint/2010/main" val="565579191"/>
       </p:ext>
     </p:extLst>
   </p:cSld>
@@ -4964,7 +5064,7 @@
           <p:cNvPr id="2" name="Title 1">
             <a:extLst>
               <a:ext uri="{FF2B5EF4-FFF2-40B4-BE49-F238E27FC236}">
-                <a16:creationId xmlns:a16="http://schemas.microsoft.com/office/drawing/2014/main" id="{CFC7A555-8EC5-5145-9973-8F1D1541E78E}"/>
+                <a16:creationId xmlns:a16="http://schemas.microsoft.com/office/drawing/2014/main" id="{AB81AE2D-6B8D-E74C-B252-A1BF358D0BE0}"/>
               </a:ext>
             </a:extLst>
           </p:cNvPr>
@@ -4982,7 +5082,7 @@
           <a:p>
             <a:r>
               <a:rPr lang="en-GB" dirty="0"/>
-              <a:t>Sample user journey</a:t>
+              <a:t>Persona two</a:t>
             </a:r>
           </a:p>
         </p:txBody>
@@ -4992,7 +5092,7 @@
           <p:cNvPr id="3" name="Content Placeholder 2">
             <a:extLst>
               <a:ext uri="{FF2B5EF4-FFF2-40B4-BE49-F238E27FC236}">
-                <a16:creationId xmlns:a16="http://schemas.microsoft.com/office/drawing/2014/main" id="{573EECF9-A196-7547-8E8B-3C159E9C7D55}"/>
+                <a16:creationId xmlns:a16="http://schemas.microsoft.com/office/drawing/2014/main" id="{11F9F2A6-3949-2C4E-BCF6-8CA1180722A5}"/>
               </a:ext>
             </a:extLst>
           </p:cNvPr>
@@ -5015,7 +5115,7 @@
     </p:spTree>
     <p:extLst>
       <p:ext uri="{BB962C8B-B14F-4D97-AF65-F5344CB8AC3E}">
-        <p14:creationId xmlns:p14="http://schemas.microsoft.com/office/powerpoint/2010/main" val="1901079578"/>
+        <p14:creationId xmlns:p14="http://schemas.microsoft.com/office/powerpoint/2010/main" val="3460019064"/>
       </p:ext>
     </p:extLst>
   </p:cSld>

</xml_diff>